<commit_message>
Abegabe- und Präsentationsfolien wurden mit neue Mockups geupdated
</commit_message>
<xml_diff>
--- a/documentation/Abgabefolien Assignement 2 (zusätzlichen Inhalt).pptx
+++ b/documentation/Abgabefolien Assignement 2 (zusätzlichen Inhalt).pptx
@@ -18,6 +18,7 @@
     <p:sldId id="263" r:id="rId15"/>
     <p:sldId id="264" r:id="rId16"/>
     <p:sldId id="265" r:id="rId17"/>
+    <p:sldId id="266" r:id="rId18"/>
   </p:sldIdLst>
   <p:sldSz cx="24384000" cy="13716000"/>
   <p:notesSz cx="6858000" cy="9144000"/>
@@ -4133,18 +4134,55 @@
           <a:chExt cx="0" cy="0"/>
         </a:xfrm>
       </p:grpSpPr>
-      <p:sp>
-        <p:nvSpPr>
-          <p:cNvPr id="216" name="Slide Number"/>
-          <p:cNvSpPr txBox="1"/>
-          <p:nvPr>
-            <p:ph type="sldNum" sz="quarter" idx="4294967295"/>
-          </p:nvPr>
-        </p:nvSpPr>
-        <p:spPr>
+      <p:pic>
+        <p:nvPicPr>
+          <p:cNvPr id="213" name="Mockup_Toggle_Bälle_v2_2.png" descr="Mockup_Toggle_Bälle_v2_2.png"/>
+          <p:cNvPicPr>
+            <a:picLocks noChangeAspect="1"/>
+          </p:cNvPicPr>
+          <p:nvPr/>
+        </p:nvPicPr>
+        <p:blipFill>
+          <a:blip r:embed="rId2">
+            <a:extLst/>
+          </a:blip>
+          <a:stretch>
+            <a:fillRect/>
+          </a:stretch>
+        </p:blipFill>
+        <p:spPr>
+          <a:xfrm>
+            <a:off x="499231" y="2283566"/>
+            <a:ext cx="13286791" cy="9040122"/>
+          </a:xfrm>
           <a:prstGeom prst="rect">
             <a:avLst/>
           </a:prstGeom>
+          <a:ln w="12700">
+            <a:miter lim="400000"/>
+          </a:ln>
+        </p:spPr>
+      </p:pic>
+      <p:sp>
+        <p:nvSpPr>
+          <p:cNvPr id="214" name="Klick auf Arbeitsthema =&gt; Popup zeigt weitere Infos wie Url, Tags, Beschreibung, etc…"/>
+          <p:cNvSpPr/>
+          <p:nvPr/>
+        </p:nvSpPr>
+        <p:spPr>
+          <a:xfrm>
+            <a:off x="13776856" y="2791790"/>
+            <a:ext cx="10369457" cy="4738115"/>
+          </a:xfrm>
+          <a:prstGeom prst="rect">
+            <a:avLst/>
+          </a:prstGeom>
+          <a:solidFill>
+            <a:srgbClr val="60D937"/>
+          </a:solidFill>
+          <a:ln w="12700">
+            <a:miter lim="400000"/>
+          </a:ln>
           <a:extLst>
             <a:ext uri="{C572A759-6A51-4108-AA02-DFA0A04FC94B}">
               <ma14:wrappingTextBoxFlag xmlns:ma14="http://schemas.microsoft.com/office/mac/drawingml/2011/main" val="1"/>
@@ -4152,6 +4190,357 @@
           </a:extLst>
         </p:spPr>
         <p:txBody>
+          <a:bodyPr lIns="50800" tIns="50800" rIns="50800" bIns="50800"/>
+          <a:lstStyle/>
+          <a:p>
+            <a:pPr algn="l" defTabSz="825500">
+              <a:lnSpc>
+                <a:spcPct val="150000"/>
+              </a:lnSpc>
+              <a:defRPr sz="3200">
+                <a:solidFill>
+                  <a:srgbClr val="000000"/>
+                </a:solidFill>
+                <a:latin typeface="Helvetica Neue Medium"/>
+                <a:ea typeface="Helvetica Neue Medium"/>
+                <a:cs typeface="Helvetica Neue Medium"/>
+                <a:sym typeface="Helvetica Neue Medium"/>
+              </a:defRPr>
+            </a:pPr>
+          </a:p>
+          <a:p>
+            <a:pPr lvl="1" marL="1481666" indent="-592666" algn="l" defTabSz="825500">
+              <a:lnSpc>
+                <a:spcPct val="150000"/>
+              </a:lnSpc>
+              <a:buSzPct val="100000"/>
+              <a:buAutoNum type="arabicPeriod" startAt="1"/>
+              <a:defRPr sz="3200">
+                <a:solidFill>
+                  <a:srgbClr val="000000"/>
+                </a:solidFill>
+                <a:latin typeface="Helvetica Neue Medium"/>
+                <a:ea typeface="Helvetica Neue Medium"/>
+                <a:cs typeface="Helvetica Neue Medium"/>
+                <a:sym typeface="Helvetica Neue Medium"/>
+              </a:defRPr>
+            </a:pPr>
+            <a:r>
+              <a:t>Klick auf Arbeitsthema =&gt; Popup zeigt weitere Infos wie Url, Tags, Beschreibung, etc</a:t>
+            </a:r>
+          </a:p>
+          <a:p>
+            <a:pPr lvl="1" marL="1481666" indent="-592666" algn="l" defTabSz="825500">
+              <a:lnSpc>
+                <a:spcPct val="150000"/>
+              </a:lnSpc>
+              <a:buSzPct val="100000"/>
+              <a:buAutoNum type="arabicPeriod" startAt="1"/>
+              <a:defRPr sz="3200">
+                <a:solidFill>
+                  <a:srgbClr val="000000"/>
+                </a:solidFill>
+                <a:latin typeface="Helvetica Neue Medium"/>
+                <a:ea typeface="Helvetica Neue Medium"/>
+                <a:cs typeface="Helvetica Neue Medium"/>
+                <a:sym typeface="Helvetica Neue Medium"/>
+              </a:defRPr>
+            </a:pPr>
+            <a:r>
+              <a:t>Vorheriges Thema</a:t>
+            </a:r>
+          </a:p>
+          <a:p>
+            <a:pPr lvl="1" marL="1481666" indent="-592666" algn="l" defTabSz="825500">
+              <a:lnSpc>
+                <a:spcPct val="150000"/>
+              </a:lnSpc>
+              <a:buSzPct val="100000"/>
+              <a:buAutoNum type="arabicPeriod" startAt="1"/>
+              <a:defRPr sz="3200">
+                <a:solidFill>
+                  <a:srgbClr val="000000"/>
+                </a:solidFill>
+                <a:latin typeface="Helvetica Neue Medium"/>
+                <a:ea typeface="Helvetica Neue Medium"/>
+                <a:cs typeface="Helvetica Neue Medium"/>
+                <a:sym typeface="Helvetica Neue Medium"/>
+              </a:defRPr>
+            </a:pPr>
+            <a:r>
+              <a:t>Nächstes Thema </a:t>
+            </a:r>
+          </a:p>
+          <a:p>
+            <a:pPr algn="l" defTabSz="825500">
+              <a:lnSpc>
+                <a:spcPct val="200000"/>
+              </a:lnSpc>
+              <a:defRPr sz="3200">
+                <a:solidFill>
+                  <a:srgbClr val="000000"/>
+                </a:solidFill>
+                <a:latin typeface="Helvetica Neue Medium"/>
+                <a:ea typeface="Helvetica Neue Medium"/>
+                <a:cs typeface="Helvetica Neue Medium"/>
+                <a:sym typeface="Helvetica Neue Medium"/>
+              </a:defRPr>
+            </a:pPr>
+          </a:p>
+        </p:txBody>
+      </p:sp>
+      <p:sp>
+        <p:nvSpPr>
+          <p:cNvPr id="215" name="1"/>
+          <p:cNvSpPr/>
+          <p:nvPr/>
+        </p:nvSpPr>
+        <p:spPr>
+          <a:xfrm>
+            <a:off x="147465" y="3181395"/>
+            <a:ext cx="948359" cy="949721"/>
+          </a:xfrm>
+          <a:prstGeom prst="ellipse">
+            <a:avLst/>
+          </a:prstGeom>
+          <a:solidFill>
+            <a:srgbClr val="60D937"/>
+          </a:solidFill>
+          <a:ln w="12700">
+            <a:miter lim="400000"/>
+          </a:ln>
+          <a:extLst>
+            <a:ext uri="{C572A759-6A51-4108-AA02-DFA0A04FC94B}">
+              <ma14:wrappingTextBoxFlag xmlns:ma14="http://schemas.microsoft.com/office/mac/drawingml/2011/main" val="1"/>
+            </a:ext>
+          </a:extLst>
+        </p:spPr>
+        <p:txBody>
+          <a:bodyPr lIns="50800" tIns="50800" rIns="50800" bIns="50800" anchor="ctr"/>
+          <a:lstStyle>
+            <a:lvl1pPr defTabSz="825500">
+              <a:defRPr b="1" sz="3700">
+                <a:solidFill>
+                  <a:srgbClr val="000000"/>
+                </a:solidFill>
+              </a:defRPr>
+            </a:lvl1pPr>
+          </a:lstStyle>
+          <a:p>
+            <a:pPr/>
+            <a:r>
+              <a:t>1</a:t>
+            </a:r>
+          </a:p>
+        </p:txBody>
+      </p:sp>
+      <p:sp>
+        <p:nvSpPr>
+          <p:cNvPr id="216" name="2"/>
+          <p:cNvSpPr/>
+          <p:nvPr/>
+        </p:nvSpPr>
+        <p:spPr>
+          <a:xfrm>
+            <a:off x="6885930" y="4619001"/>
+            <a:ext cx="948359" cy="949720"/>
+          </a:xfrm>
+          <a:prstGeom prst="ellipse">
+            <a:avLst/>
+          </a:prstGeom>
+          <a:solidFill>
+            <a:srgbClr val="60D937"/>
+          </a:solidFill>
+          <a:ln w="12700">
+            <a:miter lim="400000"/>
+          </a:ln>
+          <a:extLst>
+            <a:ext uri="{C572A759-6A51-4108-AA02-DFA0A04FC94B}">
+              <ma14:wrappingTextBoxFlag xmlns:ma14="http://schemas.microsoft.com/office/mac/drawingml/2011/main" val="1"/>
+            </a:ext>
+          </a:extLst>
+        </p:spPr>
+        <p:txBody>
+          <a:bodyPr lIns="50800" tIns="50800" rIns="50800" bIns="50800" anchor="ctr"/>
+          <a:lstStyle>
+            <a:lvl1pPr defTabSz="825500">
+              <a:defRPr b="1" sz="3700">
+                <a:solidFill>
+                  <a:srgbClr val="000000"/>
+                </a:solidFill>
+              </a:defRPr>
+            </a:lvl1pPr>
+          </a:lstStyle>
+          <a:p>
+            <a:pPr/>
+            <a:r>
+              <a:t>2</a:t>
+            </a:r>
+          </a:p>
+        </p:txBody>
+      </p:sp>
+      <p:sp>
+        <p:nvSpPr>
+          <p:cNvPr id="217" name="3"/>
+          <p:cNvSpPr/>
+          <p:nvPr/>
+        </p:nvSpPr>
+        <p:spPr>
+          <a:xfrm>
+            <a:off x="8201720" y="5050109"/>
+            <a:ext cx="948359" cy="949721"/>
+          </a:xfrm>
+          <a:prstGeom prst="ellipse">
+            <a:avLst/>
+          </a:prstGeom>
+          <a:solidFill>
+            <a:srgbClr val="60D937"/>
+          </a:solidFill>
+          <a:ln w="12700">
+            <a:miter lim="400000"/>
+          </a:ln>
+          <a:extLst>
+            <a:ext uri="{C572A759-6A51-4108-AA02-DFA0A04FC94B}">
+              <ma14:wrappingTextBoxFlag xmlns:ma14="http://schemas.microsoft.com/office/mac/drawingml/2011/main" val="1"/>
+            </a:ext>
+          </a:extLst>
+        </p:spPr>
+        <p:txBody>
+          <a:bodyPr lIns="50800" tIns="50800" rIns="50800" bIns="50800" anchor="ctr"/>
+          <a:lstStyle>
+            <a:lvl1pPr defTabSz="825500">
+              <a:defRPr b="1" sz="3700">
+                <a:solidFill>
+                  <a:srgbClr val="000000"/>
+                </a:solidFill>
+              </a:defRPr>
+            </a:lvl1pPr>
+          </a:lstStyle>
+          <a:p>
+            <a:pPr/>
+            <a:r>
+              <a:t>3</a:t>
+            </a:r>
+          </a:p>
+        </p:txBody>
+      </p:sp>
+      <p:sp>
+        <p:nvSpPr>
+          <p:cNvPr id="218" name="Hier ist eine Teilansicht aus der vorherigen Folien, aber hier wurde ein Thema selektiert"/>
+          <p:cNvSpPr/>
+          <p:nvPr/>
+        </p:nvSpPr>
+        <p:spPr>
+          <a:xfrm>
+            <a:off x="731828" y="1095129"/>
+            <a:ext cx="21755446" cy="945970"/>
+          </a:xfrm>
+          <a:prstGeom prst="rect">
+            <a:avLst/>
+          </a:prstGeom>
+          <a:solidFill>
+            <a:srgbClr val="D5D5D5"/>
+          </a:solidFill>
+          <a:ln w="12700">
+            <a:miter lim="400000"/>
+          </a:ln>
+          <a:extLst>
+            <a:ext uri="{C572A759-6A51-4108-AA02-DFA0A04FC94B}">
+              <ma14:wrappingTextBoxFlag xmlns:ma14="http://schemas.microsoft.com/office/mac/drawingml/2011/main" val="1"/>
+            </a:ext>
+          </a:extLst>
+        </p:spPr>
+        <p:txBody>
+          <a:bodyPr lIns="50800" tIns="50800" rIns="50800" bIns="50800" anchor="ctr"/>
+          <a:lstStyle>
+            <a:lvl1pPr defTabSz="825500">
+              <a:defRPr sz="3200">
+                <a:solidFill>
+                  <a:srgbClr val="000000"/>
+                </a:solidFill>
+                <a:latin typeface="Helvetica Neue Medium"/>
+                <a:ea typeface="Helvetica Neue Medium"/>
+                <a:cs typeface="Helvetica Neue Medium"/>
+                <a:sym typeface="Helvetica Neue Medium"/>
+              </a:defRPr>
+            </a:lvl1pPr>
+          </a:lstStyle>
+          <a:p>
+            <a:pPr/>
+            <a:r>
+              <a:t>Hier ist eine Teilansicht aus der vorherigen Folien, aber hier wurde ein Thema selektiert</a:t>
+            </a:r>
+          </a:p>
+        </p:txBody>
+      </p:sp>
+      <p:sp>
+        <p:nvSpPr>
+          <p:cNvPr id="219" name="Wireframes und Funktionalitäten"/>
+          <p:cNvSpPr/>
+          <p:nvPr/>
+        </p:nvSpPr>
+        <p:spPr>
+          <a:xfrm>
+            <a:off x="-80276" y="-83428"/>
+            <a:ext cx="15621561" cy="936090"/>
+          </a:xfrm>
+          <a:prstGeom prst="rect">
+            <a:avLst/>
+          </a:prstGeom>
+          <a:solidFill>
+            <a:srgbClr val="8D52FD">
+              <a:alpha val="45123"/>
+            </a:srgbClr>
+          </a:solidFill>
+          <a:ln w="12700">
+            <a:miter lim="400000"/>
+          </a:ln>
+          <a:extLst>
+            <a:ext uri="{C572A759-6A51-4108-AA02-DFA0A04FC94B}">
+              <ma14:wrappingTextBoxFlag xmlns:ma14="http://schemas.microsoft.com/office/mac/drawingml/2011/main" val="1"/>
+            </a:ext>
+          </a:extLst>
+        </p:spPr>
+        <p:txBody>
+          <a:bodyPr lIns="50800" tIns="50800" rIns="50800" bIns="50800" anchor="ctr"/>
+          <a:lstStyle/>
+          <a:p>
+            <a:pPr lvl="2" algn="l" defTabSz="825500">
+              <a:defRPr sz="3200">
+                <a:solidFill>
+                  <a:srgbClr val="FFFFFF"/>
+                </a:solidFill>
+                <a:latin typeface="Helvetica Neue Medium"/>
+                <a:ea typeface="Helvetica Neue Medium"/>
+                <a:cs typeface="Helvetica Neue Medium"/>
+                <a:sym typeface="Helvetica Neue Medium"/>
+              </a:defRPr>
+            </a:pPr>
+            <a:r>
+              <a:t>Wireframes und Funktionalitäten</a:t>
+            </a:r>
+          </a:p>
+        </p:txBody>
+      </p:sp>
+      <p:sp>
+        <p:nvSpPr>
+          <p:cNvPr id="220" name="Slide Number"/>
+          <p:cNvSpPr txBox="1"/>
+          <p:nvPr>
+            <p:ph type="sldNum" sz="quarter" idx="4294967295"/>
+          </p:nvPr>
+        </p:nvSpPr>
+        <p:spPr>
+          <a:prstGeom prst="rect">
+            <a:avLst/>
+          </a:prstGeom>
+          <a:extLst>
+            <a:ext uri="{C572A759-6A51-4108-AA02-DFA0A04FC94B}">
+              <ma14:wrappingTextBoxFlag xmlns:ma14="http://schemas.microsoft.com/office/mac/drawingml/2011/main" val="1"/>
+            </a:ext>
+          </a:extLst>
+        </p:spPr>
+        <p:txBody>
           <a:bodyPr/>
           <a:lstStyle/>
           <a:p>
@@ -4160,9 +4549,62 @@
           </a:p>
         </p:txBody>
       </p:sp>
-      <p:sp>
-        <p:nvSpPr>
-          <p:cNvPr id="217" name="Rectangle"/>
+    </p:spTree>
+  </p:cSld>
+  <p:clrMapOvr>
+    <a:masterClrMapping/>
+  </p:clrMapOvr>
+  <p:transition xmlns:p14="http://schemas.microsoft.com/office/powerpoint/2010/main" spd="med" advClick="1"/>
+</p:sld>
+</file>
+
+<file path=ppt/slides/slide11.xml><?xml version="1.0" encoding="utf-8"?>
+<p:sld xmlns:a="http://schemas.openxmlformats.org/drawingml/2006/main" xmlns:r="http://schemas.openxmlformats.org/officeDocument/2006/relationships" xmlns:p="http://schemas.openxmlformats.org/presentationml/2006/main" xmlns:m="http://schemas.openxmlformats.org/officeDocument/2006/math" xmlns:a14="http://schemas.microsoft.com/office/drawing/2010/main" showMasterSp="1" showMasterPhAnim="1">
+  <p:cSld>
+    <p:spTree>
+      <p:nvGrpSpPr>
+        <p:cNvPr id="1" name=""/>
+        <p:cNvGrpSpPr/>
+        <p:nvPr/>
+      </p:nvGrpSpPr>
+      <p:grpSpPr>
+        <a:xfrm>
+          <a:off x="0" y="0"/>
+          <a:ext cx="0" cy="0"/>
+          <a:chOff x="0" y="0"/>
+          <a:chExt cx="0" cy="0"/>
+        </a:xfrm>
+      </p:grpSpPr>
+      <p:sp>
+        <p:nvSpPr>
+          <p:cNvPr id="222" name="Slide Number"/>
+          <p:cNvSpPr txBox="1"/>
+          <p:nvPr>
+            <p:ph type="sldNum" sz="quarter" idx="4294967295"/>
+          </p:nvPr>
+        </p:nvSpPr>
+        <p:spPr>
+          <a:prstGeom prst="rect">
+            <a:avLst/>
+          </a:prstGeom>
+          <a:extLst>
+            <a:ext uri="{C572A759-6A51-4108-AA02-DFA0A04FC94B}">
+              <ma14:wrappingTextBoxFlag xmlns:ma14="http://schemas.microsoft.com/office/mac/drawingml/2011/main" val="1"/>
+            </a:ext>
+          </a:extLst>
+        </p:spPr>
+        <p:txBody>
+          <a:bodyPr/>
+          <a:lstStyle/>
+          <a:p>
+            <a:pPr/>
+            <a:fld id="{86CB4B4D-7CA3-9044-876B-883B54F8677D}" type="slidenum"/>
+          </a:p>
+        </p:txBody>
+      </p:sp>
+      <p:sp>
+        <p:nvSpPr>
+          <p:cNvPr id="223" name="Rectangle"/>
           <p:cNvSpPr/>
           <p:nvPr/>
         </p:nvSpPr>
@@ -4203,7 +4645,7 @@
       </p:sp>
       <p:sp>
         <p:nvSpPr>
-          <p:cNvPr id="218" name="3. Anwendungsstruktur"/>
+          <p:cNvPr id="224" name="3. Anwendungsstruktur"/>
           <p:cNvSpPr txBox="1"/>
           <p:nvPr/>
         </p:nvSpPr>
@@ -4805,8 +5247,8 @@
         </p:nvSpPr>
         <p:spPr>
           <a:xfrm>
-            <a:off x="244723" y="1177179"/>
-            <a:ext cx="24278035" cy="12242801"/>
+            <a:off x="244723" y="1177178"/>
+            <a:ext cx="23894554" cy="12242801"/>
           </a:xfrm>
           <a:prstGeom prst="rect">
             <a:avLst/>
@@ -4821,7 +5263,7 @@
           </a:extLst>
         </p:spPr>
         <p:txBody>
-          <a:bodyPr wrap="none" lIns="50800" tIns="50800" rIns="50800" bIns="50800" anchor="ctr">
+          <a:bodyPr lIns="50800" tIns="50800" rIns="50800" bIns="50800" anchor="ctr">
             <a:spAutoFit/>
           </a:bodyPr>
           <a:lstStyle/>
@@ -5851,7 +6293,7 @@
         <p:spPr>
           <a:xfrm>
             <a:off x="363762" y="1229491"/>
-            <a:ext cx="21705317" cy="709166"/>
+            <a:ext cx="21705317" cy="709165"/>
           </a:xfrm>
           <a:prstGeom prst="rect">
             <a:avLst/>
@@ -7149,9 +7591,40 @@
           <a:chExt cx="0" cy="0"/>
         </a:xfrm>
       </p:grpSpPr>
+      <p:sp>
+        <p:nvSpPr>
+          <p:cNvPr id="203" name="Slide Number"/>
+          <p:cNvSpPr txBox="1"/>
+          <p:nvPr>
+            <p:ph type="sldNum" sz="quarter" idx="4294967295"/>
+          </p:nvPr>
+        </p:nvSpPr>
+        <p:spPr>
+          <a:xfrm>
+            <a:off x="12065050" y="13080999"/>
+            <a:ext cx="241403" cy="374600"/>
+          </a:xfrm>
+          <a:prstGeom prst="rect">
+            <a:avLst/>
+          </a:prstGeom>
+          <a:extLst>
+            <a:ext uri="{C572A759-6A51-4108-AA02-DFA0A04FC94B}">
+              <ma14:wrappingTextBoxFlag xmlns:ma14="http://schemas.microsoft.com/office/mac/drawingml/2011/main" val="1"/>
+            </a:ext>
+          </a:extLst>
+        </p:spPr>
+        <p:txBody>
+          <a:bodyPr/>
+          <a:lstStyle/>
+          <a:p>
+            <a:pPr/>
+            <a:fld id="{86CB4B4D-7CA3-9044-876B-883B54F8677D}" type="slidenum"/>
+          </a:p>
+        </p:txBody>
+      </p:sp>
       <p:pic>
         <p:nvPicPr>
-          <p:cNvPr id="203" name="Mockup_Toggle_Bälle.png" descr="Mockup_Toggle_Bälle.png"/>
+          <p:cNvPr id="204" name="Mockup_Toggle_Bälle_v2_1.png" descr="Mockup_Toggle_Bälle_v2_1.png"/>
           <p:cNvPicPr>
             <a:picLocks noChangeAspect="1"/>
           </p:cNvPicPr>
@@ -7167,8 +7640,8 @@
         </p:blipFill>
         <p:spPr>
           <a:xfrm>
-            <a:off x="121904" y="3664647"/>
-            <a:ext cx="13944601" cy="9258301"/>
+            <a:off x="456697" y="2611708"/>
+            <a:ext cx="11972867" cy="10157830"/>
           </a:xfrm>
           <a:prstGeom prst="rect">
             <a:avLst/>
@@ -7180,110 +7653,20 @@
       </p:pic>
       <p:sp>
         <p:nvSpPr>
-          <p:cNvPr id="204" name="Diese visuell anspruchsvollere Ansicht ist erstmal ein optionales Feature und funktioniert analog zur normalen Ansicht (genaue visuelle Anforderungen können bei Umsetzung umgeändert/verbessert werden)"/>
+          <p:cNvPr id="205" name="Toggle all  =&gt;  alle aufklappen…"/>
           <p:cNvSpPr/>
           <p:nvPr/>
         </p:nvSpPr>
         <p:spPr>
           <a:xfrm>
-            <a:off x="731828" y="1095129"/>
-            <a:ext cx="21755446" cy="1360874"/>
+            <a:off x="13776856" y="2611708"/>
+            <a:ext cx="10369457" cy="10367979"/>
           </a:xfrm>
           <a:prstGeom prst="rect">
             <a:avLst/>
           </a:prstGeom>
           <a:solidFill>
-            <a:srgbClr val="D5D5D5"/>
-          </a:solidFill>
-          <a:ln w="12700">
-            <a:miter lim="400000"/>
-          </a:ln>
-          <a:extLst>
-            <a:ext uri="{C572A759-6A51-4108-AA02-DFA0A04FC94B}">
-              <ma14:wrappingTextBoxFlag xmlns:ma14="http://schemas.microsoft.com/office/mac/drawingml/2011/main" val="1"/>
-            </a:ext>
-          </a:extLst>
-        </p:spPr>
-        <p:txBody>
-          <a:bodyPr lIns="50800" tIns="50800" rIns="50800" bIns="50800" anchor="ctr"/>
-          <a:lstStyle>
-            <a:lvl1pPr defTabSz="825500">
-              <a:defRPr sz="3200">
-                <a:solidFill>
-                  <a:srgbClr val="000000"/>
-                </a:solidFill>
-                <a:latin typeface="Helvetica Neue Medium"/>
-                <a:ea typeface="Helvetica Neue Medium"/>
-                <a:cs typeface="Helvetica Neue Medium"/>
-                <a:sym typeface="Helvetica Neue Medium"/>
-              </a:defRPr>
-            </a:lvl1pPr>
-          </a:lstStyle>
-          <a:p>
-            <a:pPr/>
-            <a:r>
-              <a:t>Diese visuell anspruchsvollere Ansicht ist erstmal ein optionales Feature und funktioniert analog zur normalen Ansicht (genaue visuelle Anforderungen können bei Umsetzung umgeändert/verbessert werden)</a:t>
-            </a:r>
-          </a:p>
-        </p:txBody>
-      </p:sp>
-      <p:sp>
-        <p:nvSpPr>
-          <p:cNvPr id="205" name="Rectangle"/>
-          <p:cNvSpPr/>
-          <p:nvPr/>
-        </p:nvSpPr>
-        <p:spPr>
-          <a:xfrm>
-            <a:off x="12044790" y="6331830"/>
-            <a:ext cx="3133919" cy="6453042"/>
-          </a:xfrm>
-          <a:prstGeom prst="rect">
-            <a:avLst/>
-          </a:prstGeom>
-          <a:solidFill>
-            <a:srgbClr val="FFFFFF"/>
-          </a:solidFill>
-          <a:ln w="12700">
-            <a:miter lim="400000"/>
-          </a:ln>
-        </p:spPr>
-        <p:txBody>
-          <a:bodyPr lIns="50800" tIns="50800" rIns="50800" bIns="50800" anchor="ctr"/>
-          <a:lstStyle/>
-          <a:p>
-            <a:pPr defTabSz="825500">
-              <a:defRPr sz="3200">
-                <a:solidFill>
-                  <a:srgbClr val="FFFFFF"/>
-                </a:solidFill>
-                <a:latin typeface="Helvetica Neue Medium"/>
-                <a:ea typeface="Helvetica Neue Medium"/>
-                <a:cs typeface="Helvetica Neue Medium"/>
-                <a:sym typeface="Helvetica Neue Medium"/>
-              </a:defRPr>
-            </a:pPr>
-          </a:p>
-        </p:txBody>
-      </p:sp>
-      <p:sp>
-        <p:nvSpPr>
-          <p:cNvPr id="206" name="Toggle all  =&gt;  alle aufklappen…"/>
-          <p:cNvSpPr/>
-          <p:nvPr/>
-        </p:nvSpPr>
-        <p:spPr>
-          <a:xfrm>
-            <a:off x="12069591" y="2571326"/>
-            <a:ext cx="12183834" cy="10401188"/>
-          </a:xfrm>
-          <a:prstGeom prst="rect">
-            <a:avLst/>
-          </a:prstGeom>
-          <a:solidFill>
-            <a:srgbClr val="60D937">
-              <a:alpha val="80000"/>
-            </a:srgbClr>
+            <a:srgbClr val="60D937"/>
           </a:solidFill>
           <a:ln w="12700">
             <a:miter lim="400000"/>
@@ -7382,12 +7765,10 @@
             </a:r>
           </a:p>
           <a:p>
-            <a:pPr lvl="1" marL="1481666" indent="-592666" algn="l" defTabSz="825500">
+            <a:pPr algn="l" defTabSz="825500">
               <a:lnSpc>
                 <a:spcPct val="150000"/>
               </a:lnSpc>
-              <a:buSzPct val="100000"/>
-              <a:buAutoNum type="arabicPeriod" startAt="1"/>
               <a:defRPr sz="3200">
                 <a:solidFill>
                   <a:srgbClr val="000000"/>
@@ -7398,30 +7779,6 @@
                 <a:sym typeface="Helvetica Neue Medium"/>
               </a:defRPr>
             </a:pPr>
-            <a:r>
-              <a:t>Klick auf Arbeitsthema =&gt; Popup zeigt weitere Infos wie Url, Tags, Beschreibung, etc</a:t>
-            </a:r>
-          </a:p>
-          <a:p>
-            <a:pPr lvl="1" marL="1481666" indent="-592666" algn="l" defTabSz="825500">
-              <a:lnSpc>
-                <a:spcPct val="150000"/>
-              </a:lnSpc>
-              <a:buSzPct val="100000"/>
-              <a:buAutoNum type="arabicPeriod" startAt="1"/>
-              <a:defRPr sz="3200">
-                <a:solidFill>
-                  <a:srgbClr val="000000"/>
-                </a:solidFill>
-                <a:latin typeface="Helvetica Neue Medium"/>
-                <a:ea typeface="Helvetica Neue Medium"/>
-                <a:cs typeface="Helvetica Neue Medium"/>
-                <a:sym typeface="Helvetica Neue Medium"/>
-              </a:defRPr>
-            </a:pPr>
-            <a:r>
-              <a:t>Previous / Next Thema </a:t>
-            </a:r>
           </a:p>
           <a:p>
             <a:pPr algn="l" defTabSz="825500">
@@ -7495,13 +7852,13 @@
       </p:sp>
       <p:sp>
         <p:nvSpPr>
-          <p:cNvPr id="207" name="1"/>
+          <p:cNvPr id="206" name="1"/>
           <p:cNvSpPr/>
           <p:nvPr/>
         </p:nvSpPr>
         <p:spPr>
           <a:xfrm>
-            <a:off x="1142110" y="2711236"/>
+            <a:off x="147465" y="2936899"/>
             <a:ext cx="948359" cy="949720"/>
           </a:xfrm>
           <a:prstGeom prst="ellipse">
@@ -7540,14 +7897,14 @@
       </p:sp>
       <p:sp>
         <p:nvSpPr>
-          <p:cNvPr id="208" name="2"/>
+          <p:cNvPr id="207" name="2"/>
           <p:cNvSpPr/>
           <p:nvPr/>
         </p:nvSpPr>
         <p:spPr>
           <a:xfrm>
-            <a:off x="5807726" y="2711236"/>
-            <a:ext cx="948359" cy="949720"/>
+            <a:off x="5021886" y="2936899"/>
+            <a:ext cx="948358" cy="949720"/>
           </a:xfrm>
           <a:prstGeom prst="ellipse">
             <a:avLst/>
@@ -7585,13 +7942,13 @@
       </p:sp>
       <p:sp>
         <p:nvSpPr>
-          <p:cNvPr id="209" name="3"/>
+          <p:cNvPr id="208" name="3"/>
           <p:cNvSpPr/>
           <p:nvPr/>
         </p:nvSpPr>
         <p:spPr>
           <a:xfrm>
-            <a:off x="147465" y="5129969"/>
+            <a:off x="147465" y="5611183"/>
             <a:ext cx="948359" cy="949721"/>
           </a:xfrm>
           <a:prstGeom prst="ellipse">
@@ -7630,14 +7987,14 @@
       </p:sp>
       <p:sp>
         <p:nvSpPr>
-          <p:cNvPr id="210" name="4"/>
+          <p:cNvPr id="209" name="4"/>
           <p:cNvSpPr/>
           <p:nvPr/>
         </p:nvSpPr>
         <p:spPr>
           <a:xfrm>
-            <a:off x="337628" y="8272657"/>
-            <a:ext cx="948358" cy="949720"/>
+            <a:off x="1028784" y="10051431"/>
+            <a:ext cx="948359" cy="949720"/>
           </a:xfrm>
           <a:prstGeom prst="ellipse">
             <a:avLst/>
@@ -7675,20 +8032,20 @@
       </p:sp>
       <p:sp>
         <p:nvSpPr>
-          <p:cNvPr id="211" name="5"/>
+          <p:cNvPr id="210" name="Diese visuell anspruchsvollere Ansicht ist erstmal ein optionales Feature und funktioniert analog zur normalen Ansicht (genaue visuelle Anforderungen können bei Umsetzung umgeändert/verbessert werden)"/>
           <p:cNvSpPr/>
           <p:nvPr/>
         </p:nvSpPr>
         <p:spPr>
           <a:xfrm>
-            <a:off x="1320360" y="10269589"/>
-            <a:ext cx="948358" cy="949720"/>
+            <a:off x="731828" y="1095129"/>
+            <a:ext cx="21755446" cy="1360874"/>
           </a:xfrm>
-          <a:prstGeom prst="ellipse">
+          <a:prstGeom prst="rect">
             <a:avLst/>
           </a:prstGeom>
           <a:solidFill>
-            <a:srgbClr val="60D937"/>
+            <a:srgbClr val="D5D5D5"/>
           </a:solidFill>
           <a:ln w="12700">
             <a:miter lim="400000"/>
@@ -7703,100 +8060,28 @@
           <a:bodyPr lIns="50800" tIns="50800" rIns="50800" bIns="50800" anchor="ctr"/>
           <a:lstStyle>
             <a:lvl1pPr defTabSz="825500">
-              <a:defRPr b="1" sz="3700">
+              <a:defRPr sz="3200">
                 <a:solidFill>
                   <a:srgbClr val="000000"/>
                 </a:solidFill>
+                <a:latin typeface="Helvetica Neue Medium"/>
+                <a:ea typeface="Helvetica Neue Medium"/>
+                <a:cs typeface="Helvetica Neue Medium"/>
+                <a:sym typeface="Helvetica Neue Medium"/>
               </a:defRPr>
             </a:lvl1pPr>
           </a:lstStyle>
           <a:p>
             <a:pPr/>
             <a:r>
-              <a:t>5</a:t>
-            </a:r>
-          </a:p>
-        </p:txBody>
-      </p:sp>
-      <p:sp>
-        <p:nvSpPr>
-          <p:cNvPr id="212" name="6"/>
-          <p:cNvSpPr/>
-          <p:nvPr/>
-        </p:nvSpPr>
-        <p:spPr>
-          <a:xfrm>
-            <a:off x="8275986" y="8272657"/>
-            <a:ext cx="948359" cy="949720"/>
-          </a:xfrm>
-          <a:prstGeom prst="ellipse">
-            <a:avLst/>
-          </a:prstGeom>
-          <a:solidFill>
-            <a:srgbClr val="60D937"/>
-          </a:solidFill>
-          <a:ln w="12700">
-            <a:miter lim="400000"/>
-          </a:ln>
-          <a:extLst>
-            <a:ext uri="{C572A759-6A51-4108-AA02-DFA0A04FC94B}">
-              <ma14:wrappingTextBoxFlag xmlns:ma14="http://schemas.microsoft.com/office/mac/drawingml/2011/main" val="1"/>
-            </a:ext>
-          </a:extLst>
-        </p:spPr>
-        <p:txBody>
-          <a:bodyPr lIns="50800" tIns="50800" rIns="50800" bIns="50800" anchor="ctr"/>
-          <a:lstStyle>
-            <a:lvl1pPr defTabSz="825500">
-              <a:defRPr b="1" sz="3700">
-                <a:solidFill>
-                  <a:srgbClr val="000000"/>
-                </a:solidFill>
-              </a:defRPr>
-            </a:lvl1pPr>
-          </a:lstStyle>
-          <a:p>
-            <a:pPr/>
-            <a:r>
-              <a:t>6</a:t>
-            </a:r>
-          </a:p>
-        </p:txBody>
-      </p:sp>
-      <p:sp>
-        <p:nvSpPr>
-          <p:cNvPr id="213" name="Slide Number"/>
-          <p:cNvSpPr txBox="1"/>
-          <p:nvPr>
-            <p:ph type="sldNum" sz="quarter" idx="4294967295"/>
-          </p:nvPr>
-        </p:nvSpPr>
-        <p:spPr>
-          <a:xfrm>
-            <a:off x="12065050" y="13080999"/>
-            <a:ext cx="241403" cy="374600"/>
-          </a:xfrm>
-          <a:prstGeom prst="rect">
-            <a:avLst/>
-          </a:prstGeom>
-          <a:extLst>
-            <a:ext uri="{C572A759-6A51-4108-AA02-DFA0A04FC94B}">
-              <ma14:wrappingTextBoxFlag xmlns:ma14="http://schemas.microsoft.com/office/mac/drawingml/2011/main" val="1"/>
-            </a:ext>
-          </a:extLst>
-        </p:spPr>
-        <p:txBody>
-          <a:bodyPr/>
-          <a:lstStyle/>
-          <a:p>
-            <a:pPr/>
-            <a:fld id="{86CB4B4D-7CA3-9044-876B-883B54F8677D}" type="slidenum"/>
-          </a:p>
-        </p:txBody>
-      </p:sp>
-      <p:sp>
-        <p:nvSpPr>
-          <p:cNvPr id="214" name="Wireframes und Funktionalitäten"/>
+              <a:t>Diese visuell anspruchsvollere Ansicht ist erstmal ein optionales Feature und funktioniert analog zur normalen Ansicht (genaue visuelle Anforderungen können bei Umsetzung umgeändert/verbessert werden)</a:t>
+            </a:r>
+          </a:p>
+        </p:txBody>
+      </p:sp>
+      <p:sp>
+        <p:nvSpPr>
+          <p:cNvPr id="211" name="Wireframes und Funktionalitäten"/>
           <p:cNvSpPr/>
           <p:nvPr/>
         </p:nvSpPr>

</xml_diff>